<commit_message>
Minor fixes on lesson 5. Added new lesson 6.
</commit_message>
<xml_diff>
--- a/Lesson5/AdvancedRoboticsLesson5.pptx
+++ b/Lesson5/AdvancedRoboticsLesson5.pptx
@@ -212,7 +212,7 @@
           <a:p>
             <a:fld id="{88DFE0DC-517A-40C1-B3B1-8C641051689B}" type="datetimeFigureOut">
               <a:rPr lang="en-US" smtClean="0"/>
-              <a:t>12/7/2020</a:t>
+              <a:t>12/10/2020</a:t>
             </a:fld>
             <a:endParaRPr lang="en-US"/>
           </a:p>
@@ -899,7 +899,7 @@
             <a:fld id="{5923F103-BC34-4FE4-A40E-EDDEECFDA5D0}" type="datetimeFigureOut">
               <a:rPr lang="en-US" dirty="0"/>
               <a:pPr/>
-              <a:t>12/7/2020</a:t>
+              <a:t>12/10/2020</a:t>
             </a:fld>
             <a:endParaRPr lang="en-US" dirty="0"/>
           </a:p>
@@ -1983,7 +1983,7 @@
           <a:p>
             <a:fld id="{923A1CC3-2375-41D4-9E03-427CAF2A4C1A}" type="datetimeFigureOut">
               <a:rPr lang="en-US" dirty="0"/>
-              <a:t>12/7/2020</a:t>
+              <a:t>12/10/2020</a:t>
             </a:fld>
             <a:endParaRPr lang="en-US" dirty="0"/>
           </a:p>
@@ -2959,7 +2959,7 @@
           <a:p>
             <a:fld id="{AFF16868-8199-4C2C-A5B1-63AEE139F88E}" type="datetimeFigureOut">
               <a:rPr lang="en-US" dirty="0"/>
-              <a:t>12/7/2020</a:t>
+              <a:t>12/10/2020</a:t>
             </a:fld>
             <a:endParaRPr lang="en-US" dirty="0"/>
           </a:p>
@@ -4089,7 +4089,7 @@
           <a:p>
             <a:fld id="{AAD9FF7F-6988-44CC-821B-644E70CD2F73}" type="datetimeFigureOut">
               <a:rPr lang="en-US" dirty="0"/>
-              <a:t>12/7/2020</a:t>
+              <a:t>12/10/2020</a:t>
             </a:fld>
             <a:endParaRPr lang="en-US" dirty="0"/>
           </a:p>
@@ -5118,7 +5118,7 @@
           <a:p>
             <a:fld id="{5C12C299-16B2-4475-990D-751901EACC14}" type="datetimeFigureOut">
               <a:rPr lang="en-US" dirty="0"/>
-              <a:t>12/7/2020</a:t>
+              <a:t>12/10/2020</a:t>
             </a:fld>
             <a:endParaRPr lang="en-US" dirty="0"/>
           </a:p>
@@ -5774,7 +5774,7 @@
           <a:p>
             <a:fld id="{9FE86839-B9D8-4651-8783-F325ECE74E65}" type="datetimeFigureOut">
               <a:rPr lang="en-US" dirty="0"/>
-              <a:t>12/7/2020</a:t>
+              <a:t>12/10/2020</a:t>
             </a:fld>
             <a:endParaRPr lang="en-US" dirty="0"/>
           </a:p>
@@ -6631,7 +6631,7 @@
           <a:p>
             <a:fld id="{FD484F64-32F6-45C5-931F-ADC1662401D0}" type="datetimeFigureOut">
               <a:rPr lang="en-US" dirty="0"/>
-              <a:t>12/7/2020</a:t>
+              <a:t>12/10/2020</a:t>
             </a:fld>
             <a:endParaRPr lang="en-US" dirty="0"/>
           </a:p>
@@ -6817,7 +6817,7 @@
           <a:p>
             <a:fld id="{53086D93-FCAC-47E0-A2EE-787E62CA814C}" type="datetimeFigureOut">
               <a:rPr lang="en-US" dirty="0"/>
-              <a:t>12/7/2020</a:t>
+              <a:t>12/10/2020</a:t>
             </a:fld>
             <a:endParaRPr lang="en-US" dirty="0"/>
           </a:p>
@@ -7785,7 +7785,7 @@
           <a:p>
             <a:fld id="{CDA879A6-0FD0-4734-A311-86BFCA472E6E}" type="datetimeFigureOut">
               <a:rPr lang="en-US" dirty="0"/>
-              <a:t>12/7/2020</a:t>
+              <a:t>12/10/2020</a:t>
             </a:fld>
             <a:endParaRPr lang="en-US" dirty="0"/>
           </a:p>
@@ -7992,7 +7992,7 @@
           <a:p>
             <a:fld id="{19C9CA7B-DFD4-44B5-8C60-D14B8CD1FB59}" type="datetimeFigureOut">
               <a:rPr lang="en-US" dirty="0"/>
-              <a:t>12/7/2020</a:t>
+              <a:t>12/10/2020</a:t>
             </a:fld>
             <a:endParaRPr lang="en-US" dirty="0"/>
           </a:p>
@@ -9022,7 +9022,7 @@
           <a:p>
             <a:fld id="{F34E6425-0181-43F2-84FC-787E803FD2F8}" type="datetimeFigureOut">
               <a:rPr lang="en-US" dirty="0"/>
-              <a:t>12/7/2020</a:t>
+              <a:t>12/10/2020</a:t>
             </a:fld>
             <a:endParaRPr lang="en-US" dirty="0"/>
           </a:p>
@@ -9290,7 +9290,7 @@
           <a:p>
             <a:fld id="{3BDB8791-F1B0-41E7-B7FD-A781E65C4266}" type="datetimeFigureOut">
               <a:rPr lang="en-US" dirty="0"/>
-              <a:t>12/7/2020</a:t>
+              <a:t>12/10/2020</a:t>
             </a:fld>
             <a:endParaRPr lang="en-US" dirty="0"/>
           </a:p>
@@ -9696,7 +9696,7 @@
           <a:p>
             <a:fld id="{5FDD63B2-E120-4ED8-B27B-C685F510A5FE}" type="datetimeFigureOut">
               <a:rPr lang="en-US" dirty="0"/>
-              <a:t>12/7/2020</a:t>
+              <a:t>12/10/2020</a:t>
             </a:fld>
             <a:endParaRPr lang="en-US" dirty="0"/>
           </a:p>
@@ -9819,7 +9819,7 @@
           <a:p>
             <a:fld id="{7AA18ACC-A947-437B-A130-35BD54FDF1E9}" type="datetimeFigureOut">
               <a:rPr lang="en-US" dirty="0"/>
-              <a:t>12/7/2020</a:t>
+              <a:t>12/10/2020</a:t>
             </a:fld>
             <a:endParaRPr lang="en-US" dirty="0"/>
           </a:p>
@@ -9910,7 +9910,7 @@
           <a:p>
             <a:fld id="{7C8D7E02-BCB8-4D50-A234-369438C08659}" type="datetimeFigureOut">
               <a:rPr lang="en-US" dirty="0"/>
-              <a:t>12/7/2020</a:t>
+              <a:t>12/10/2020</a:t>
             </a:fld>
             <a:endParaRPr lang="en-US" dirty="0"/>
           </a:p>
@@ -10987,7 +10987,7 @@
           <a:p>
             <a:fld id="{76E86A4C-8E40-4F87-A4F0-01A0687C5742}" type="datetimeFigureOut">
               <a:rPr lang="en-US" dirty="0"/>
-              <a:t>12/7/2020</a:t>
+              <a:t>12/10/2020</a:t>
             </a:fld>
             <a:endParaRPr lang="en-US" dirty="0"/>
           </a:p>
@@ -12091,7 +12091,7 @@
           <a:p>
             <a:fld id="{35E72C73-2D91-4E12-BA25-F0AA0C03599B}" type="datetimeFigureOut">
               <a:rPr lang="en-US" dirty="0"/>
-              <a:t>12/7/2020</a:t>
+              <a:t>12/10/2020</a:t>
             </a:fld>
             <a:endParaRPr lang="en-US" dirty="0"/>
           </a:p>
@@ -13084,7 +13084,7 @@
           <a:p>
             <a:fld id="{2BE451C3-0FF4-47C4-B829-773ADF60F88C}" type="datetimeFigureOut">
               <a:rPr lang="en-US" dirty="0"/>
-              <a:t>12/7/2020</a:t>
+              <a:t>12/10/2020</a:t>
             </a:fld>
             <a:endParaRPr lang="en-US" dirty="0"/>
           </a:p>

</xml_diff>